<commit_message>
04 - update to latest angular cli, put bootstrap CSS style into .angular-cli.json, update slides slightly
</commit_message>
<xml_diff>
--- a/04/04.pptx
+++ b/04/04.pptx
@@ -277,7 +277,7 @@
           <a:p>
             <a:fld id="{B5389E1E-C654-E943-9883-792E99AD7287}" type="datetimeFigureOut">
               <a:rPr lang="en-US" smtClean="0"/>
-              <a:t>3/22/2017</a:t>
+              <a:t>3/27/2017</a:t>
             </a:fld>
             <a:endParaRPr lang="en-US"/>
           </a:p>
@@ -443,7 +443,7 @@
           <a:p>
             <a:fld id="{9920D99B-2862-464A-984E-65BFC5FC0BBC}" type="datetimeFigureOut">
               <a:rPr lang="en-US" smtClean="0"/>
-              <a:t>3/22/2017</a:t>
+              <a:t>3/27/2017</a:t>
             </a:fld>
             <a:endParaRPr lang="en-US"/>
           </a:p>
@@ -9452,27 +9452,7 @@
           <a:p>
             <a:r>
               <a:rPr lang="en-US" dirty="0"/>
-              <a:t>Execute Angular 2: </a:t>
-            </a:r>
-          </a:p>
-          <a:p>
-            <a:pPr marL="342900" indent="-342900">
-              <a:buFont typeface="Arial" panose="020B0604020202020204" pitchFamily="34" charset="0"/>
-              <a:buChar char="•"/>
-            </a:pPr>
-            <a:r>
-              <a:rPr lang="en-US" dirty="0" err="1">
-                <a:latin typeface="Courier New" panose="02070309020205020404" pitchFamily="49" charset="0"/>
-                <a:cs typeface="Courier New" panose="02070309020205020404" pitchFamily="49" charset="0"/>
-              </a:rPr>
-              <a:t>npm</a:t>
-            </a:r>
-            <a:r>
-              <a:rPr lang="en-US" dirty="0">
-                <a:latin typeface="Courier New" panose="02070309020205020404" pitchFamily="49" charset="0"/>
-                <a:cs typeface="Courier New" panose="02070309020205020404" pitchFamily="49" charset="0"/>
-              </a:rPr>
-              <a:t> install angular-cli</a:t>
+              <a:t>Execute Angular 2 app:</a:t>
             </a:r>
           </a:p>
           <a:p>

</xml_diff>

<commit_message>
updates to part 4 - removed _workshop (confusion) - updated slide deck and reprinted PDF
</commit_message>
<xml_diff>
--- a/04/04.pptx
+++ b/04/04.pptx
@@ -6,10 +6,10 @@
     <p:sldMasterId id="2147483684" r:id="rId2"/>
   </p:sldMasterIdLst>
   <p:notesMasterIdLst>
-    <p:notesMasterId r:id="rId20"/>
+    <p:notesMasterId r:id="rId19"/>
   </p:notesMasterIdLst>
   <p:handoutMasterIdLst>
-    <p:handoutMasterId r:id="rId21"/>
+    <p:handoutMasterId r:id="rId20"/>
   </p:handoutMasterIdLst>
   <p:sldIdLst>
     <p:sldId id="444" r:id="rId3"/>
@@ -24,11 +24,10 @@
     <p:sldId id="509" r:id="rId12"/>
     <p:sldId id="510" r:id="rId13"/>
     <p:sldId id="511" r:id="rId14"/>
-    <p:sldId id="502" r:id="rId15"/>
-    <p:sldId id="501" r:id="rId16"/>
-    <p:sldId id="484" r:id="rId17"/>
-    <p:sldId id="512" r:id="rId18"/>
-    <p:sldId id="513" r:id="rId19"/>
+    <p:sldId id="501" r:id="rId15"/>
+    <p:sldId id="484" r:id="rId16"/>
+    <p:sldId id="512" r:id="rId17"/>
+    <p:sldId id="513" r:id="rId18"/>
   </p:sldIdLst>
   <p:sldSz cx="9144000" cy="5143500" type="screen16x9"/>
   <p:notesSz cx="6858000" cy="9144000"/>
@@ -144,7 +143,6 @@
             <p14:sldId id="509"/>
             <p14:sldId id="510"/>
             <p14:sldId id="511"/>
-            <p14:sldId id="502"/>
             <p14:sldId id="501"/>
             <p14:sldId id="484"/>
             <p14:sldId id="512"/>
@@ -195,6 +193,10 @@
 </p:presentation>
 </file>
 
+<file path=ppt/revisionInfo.xml><?xml version="1.0" encoding="utf-8"?>
+<p1510:revInfo xmlns:a="http://schemas.openxmlformats.org/drawingml/2006/main" xmlns:r="http://schemas.openxmlformats.org/officeDocument/2006/relationships" xmlns:p1510="http://schemas.microsoft.com/office/powerpoint/2015/10/main"/>
+</file>
+
 <file path=ppt/handoutMasters/handoutMaster1.xml><?xml version="1.0" encoding="utf-8"?>
 <p:handoutMaster xmlns:a="http://schemas.openxmlformats.org/drawingml/2006/main" xmlns:r="http://schemas.openxmlformats.org/officeDocument/2006/relationships" xmlns:p="http://schemas.openxmlformats.org/presentationml/2006/main">
   <p:cSld>
@@ -277,7 +279,7 @@
           <a:p>
             <a:fld id="{B5389E1E-C654-E943-9883-792E99AD7287}" type="datetimeFigureOut">
               <a:rPr lang="en-US" smtClean="0"/>
-              <a:t>3/27/2017</a:t>
+              <a:t>11/2/2017</a:t>
             </a:fld>
             <a:endParaRPr lang="en-US"/>
           </a:p>
@@ -443,7 +445,7 @@
           <a:p>
             <a:fld id="{9920D99B-2862-464A-984E-65BFC5FC0BBC}" type="datetimeFigureOut">
               <a:rPr lang="en-US" smtClean="0"/>
-              <a:t>3/27/2017</a:t>
+              <a:t>11/2/2017</a:t>
             </a:fld>
             <a:endParaRPr lang="en-US"/>
           </a:p>
@@ -938,20 +940,105 @@
           <a:bodyPr/>
           <a:lstStyle/>
           <a:p>
+            <a:pPr marL="0" marR="0" lvl="0" indent="0" algn="l" defTabSz="457200" rtl="0" eaLnBrk="1" fontAlgn="auto" latinLnBrk="0" hangingPunct="1">
+              <a:lnSpc>
+                <a:spcPct val="100000"/>
+              </a:lnSpc>
+              <a:spcBef>
+                <a:spcPts val="0"/>
+              </a:spcBef>
+              <a:spcAft>
+                <a:spcPts val="0"/>
+              </a:spcAft>
+              <a:buClrTx/>
+              <a:buSzTx/>
+              <a:buFontTx/>
+              <a:buNone/>
+              <a:tabLst/>
+              <a:defRPr/>
+            </a:pPr>
             <a:r>
               <a:rPr lang="en-US" dirty="0"/>
-              <a:t>We</a:t>
-            </a:r>
-            <a:r>
-              <a:rPr lang="en-US" baseline="0" dirty="0"/>
-              <a:t> started this workshop a while ago, but we haven’t been keeping up with Angular, so you might get an error message if you don’t use 1.0.0-beta.10</a:t>
-            </a:r>
-          </a:p>
-          <a:p>
-            <a:r>
-              <a:rPr lang="en-US" baseline="0" dirty="0"/>
-              <a:t>Then kick off the angular server with ng serve</a:t>
-            </a:r>
+              <a:t>If you don't care about Angular, use the completed project to consume the </a:t>
+            </a:r>
+            <a:r>
+              <a:rPr lang="en-US" dirty="0" err="1"/>
+              <a:t>webapi</a:t>
+            </a:r>
+            <a:endParaRPr lang="en-US" dirty="0"/>
+          </a:p>
+          <a:p>
+            <a:pPr marL="0" marR="0" lvl="0" indent="0" algn="l" defTabSz="457200" rtl="0" eaLnBrk="1" fontAlgn="auto" latinLnBrk="0" hangingPunct="1">
+              <a:lnSpc>
+                <a:spcPct val="100000"/>
+              </a:lnSpc>
+              <a:spcBef>
+                <a:spcPts val="0"/>
+              </a:spcBef>
+              <a:spcAft>
+                <a:spcPts val="0"/>
+              </a:spcAft>
+              <a:buClrTx/>
+              <a:buSzTx/>
+              <a:buFontTx/>
+              <a:buNone/>
+              <a:tabLst/>
+              <a:defRPr/>
+            </a:pPr>
+            <a:r>
+              <a:rPr lang="en-US" dirty="0"/>
+              <a:t>You can use the </a:t>
+            </a:r>
+            <a:r>
+              <a:rPr lang="en-US" dirty="0" err="1"/>
+              <a:t>WebAPI</a:t>
+            </a:r>
+            <a:r>
+              <a:rPr lang="en-US" dirty="0"/>
+              <a:t> with the JS framework of your choice (react, Aurelia, </a:t>
+            </a:r>
+            <a:r>
+              <a:rPr lang="en-US" dirty="0" err="1"/>
+              <a:t>jquery</a:t>
+            </a:r>
+            <a:r>
+              <a:rPr lang="en-US" dirty="0"/>
+              <a:t>) as homework</a:t>
+            </a:r>
+          </a:p>
+          <a:p>
+            <a:pPr marL="0" marR="0" lvl="0" indent="0" algn="l" defTabSz="457200" rtl="0" eaLnBrk="1" fontAlgn="auto" latinLnBrk="0" hangingPunct="1">
+              <a:lnSpc>
+                <a:spcPct val="100000"/>
+              </a:lnSpc>
+              <a:spcBef>
+                <a:spcPts val="0"/>
+              </a:spcBef>
+              <a:spcAft>
+                <a:spcPts val="0"/>
+              </a:spcAft>
+              <a:buClrTx/>
+              <a:buSzTx/>
+              <a:buFontTx/>
+              <a:buNone/>
+              <a:tabLst/>
+              <a:defRPr/>
+            </a:pPr>
+            <a:r>
+              <a:rPr lang="en-US" dirty="0"/>
+              <a:t>Or you can switch </a:t>
+            </a:r>
+            <a:r>
+              <a:rPr lang="en-US"/>
+              <a:t>to plain </a:t>
+            </a:r>
+            <a:r>
+              <a:rPr lang="en-US" dirty="0"/>
+              <a:t>ASP.NET MVC and not even use JS if you want</a:t>
+            </a:r>
+          </a:p>
+          <a:p>
+            <a:endParaRPr lang="en-US" dirty="0"/>
           </a:p>
         </p:txBody>
       </p:sp>
@@ -972,7 +1059,7 @@
           <a:p>
             <a:fld id="{F39351FC-18D6-4741-8EEB-9FDB1F020AAC}" type="slidenum">
               <a:rPr lang="en-US" smtClean="0"/>
-              <a:t>14</a:t>
+              <a:t>15</a:t>
             </a:fld>
             <a:endParaRPr lang="en-US"/>
           </a:p>
@@ -981,7 +1068,7 @@
     </p:spTree>
     <p:extLst>
       <p:ext uri="{BB962C8B-B14F-4D97-AF65-F5344CB8AC3E}">
-        <p14:creationId xmlns:p14="http://schemas.microsoft.com/office/powerpoint/2010/main" val="1659110175"/>
+        <p14:creationId xmlns:p14="http://schemas.microsoft.com/office/powerpoint/2010/main" val="1405858872"/>
       </p:ext>
     </p:extLst>
   </p:cSld>
@@ -1925,16 +2012,17 @@
           <a:p>
             <a:r>
               <a:rPr lang="en-US" dirty="0"/>
-              <a:t>So that should be enough to get you started.</a:t>
-            </a:r>
-          </a:p>
-          <a:p>
-            <a:endParaRPr lang="en-US" dirty="0"/>
-          </a:p>
-          <a:p>
-            <a:r>
-              <a:rPr lang="en-US" dirty="0"/>
-              <a:t>Here are the files in </a:t>
+              <a:t>We</a:t>
+            </a:r>
+            <a:r>
+              <a:rPr lang="en-US" baseline="0" dirty="0"/>
+              <a:t> started this workshop a while ago, but we haven’t been keeping up with Angular, so you might get an error message if you don’t use 1.0.0-beta.10</a:t>
+            </a:r>
+          </a:p>
+          <a:p>
+            <a:r>
+              <a:rPr lang="en-US" baseline="0" dirty="0"/>
+              <a:t>Then kick off the angular server with ng serve</a:t>
             </a:r>
           </a:p>
         </p:txBody>
@@ -1965,7 +2053,7 @@
     </p:spTree>
     <p:extLst>
       <p:ext uri="{BB962C8B-B14F-4D97-AF65-F5344CB8AC3E}">
-        <p14:creationId xmlns:p14="http://schemas.microsoft.com/office/powerpoint/2010/main" val="1787420976"/>
+        <p14:creationId xmlns:p14="http://schemas.microsoft.com/office/powerpoint/2010/main" val="1659110175"/>
       </p:ext>
     </p:extLst>
   </p:cSld>
@@ -9241,195 +9329,6 @@
           <a:p>
             <a:r>
               <a:rPr lang="en-US" dirty="0"/>
-              <a:t>Angular</a:t>
-            </a:r>
-          </a:p>
-        </p:txBody>
-      </p:sp>
-      <p:sp>
-        <p:nvSpPr>
-          <p:cNvPr id="5" name="Content Placeholder 2"/>
-          <p:cNvSpPr>
-            <a:spLocks noGrp="1"/>
-          </p:cNvSpPr>
-          <p:nvPr>
-            <p:ph idx="1"/>
-          </p:nvPr>
-        </p:nvSpPr>
-        <p:spPr>
-          <a:xfrm>
-            <a:off x="457200" y="685800"/>
-            <a:ext cx="8007739" cy="3394472"/>
-          </a:xfrm>
-        </p:spPr>
-        <p:txBody>
-          <a:bodyPr/>
-          <a:lstStyle/>
-          <a:p>
-            <a:pPr marL="342900" indent="-342900">
-              <a:buFont typeface="Arial" panose="020B0604020202020204" pitchFamily="34" charset="0"/>
-              <a:buChar char="•"/>
-            </a:pPr>
-            <a:r>
-              <a:rPr lang="en-US" dirty="0"/>
-              <a:t>Look for  TODOs</a:t>
-            </a:r>
-          </a:p>
-          <a:p>
-            <a:pPr marL="342900" indent="-342900">
-              <a:buFont typeface="Arial" panose="020B0604020202020204" pitchFamily="34" charset="0"/>
-              <a:buChar char="•"/>
-            </a:pPr>
-            <a:endParaRPr lang="en-US" dirty="0"/>
-          </a:p>
-          <a:p>
-            <a:pPr marL="342900" indent="-342900">
-              <a:buFont typeface="Arial" panose="020B0604020202020204" pitchFamily="34" charset="0"/>
-              <a:buChar char="•"/>
-            </a:pPr>
-            <a:r>
-              <a:rPr lang="en-US" dirty="0"/>
-              <a:t>Files included:</a:t>
-            </a:r>
-          </a:p>
-          <a:p>
-            <a:pPr marL="573088" lvl="1" indent="-342900">
-              <a:buFont typeface="Arial" panose="020B0604020202020204" pitchFamily="34" charset="0"/>
-              <a:buChar char="•"/>
-            </a:pPr>
-            <a:r>
-              <a:rPr lang="en-US" sz="2000" dirty="0" err="1"/>
-              <a:t>app.module.ts</a:t>
-            </a:r>
-            <a:endParaRPr lang="en-US" sz="2000" dirty="0"/>
-          </a:p>
-          <a:p>
-            <a:pPr marL="573088" lvl="1" indent="-342900">
-              <a:buFont typeface="Arial" panose="020B0604020202020204" pitchFamily="34" charset="0"/>
-              <a:buChar char="•"/>
-            </a:pPr>
-            <a:r>
-              <a:rPr lang="en-US" sz="2000" dirty="0" err="1"/>
-              <a:t>utility.ts</a:t>
-            </a:r>
-            <a:endParaRPr lang="en-US" sz="2000" dirty="0"/>
-          </a:p>
-          <a:p>
-            <a:pPr marL="573088" lvl="1" indent="-342900">
-              <a:buFont typeface="Arial" panose="020B0604020202020204" pitchFamily="34" charset="0"/>
-              <a:buChar char="•"/>
-            </a:pPr>
-            <a:r>
-              <a:rPr lang="en-US" sz="2000" dirty="0" err="1"/>
-              <a:t>item.ts</a:t>
-            </a:r>
-            <a:endParaRPr lang="en-US" sz="2000" dirty="0"/>
-          </a:p>
-          <a:p>
-            <a:pPr marL="573088" lvl="1" indent="-342900">
-              <a:buFont typeface="Arial" panose="020B0604020202020204" pitchFamily="34" charset="0"/>
-              <a:buChar char="•"/>
-            </a:pPr>
-            <a:r>
-              <a:rPr lang="en-US" sz="2000" dirty="0" err="1"/>
-              <a:t>item.component.ts</a:t>
-            </a:r>
-            <a:endParaRPr lang="en-US" sz="2000" dirty="0"/>
-          </a:p>
-          <a:p>
-            <a:pPr marL="573088" lvl="1" indent="-342900">
-              <a:buFont typeface="Arial" panose="020B0604020202020204" pitchFamily="34" charset="0"/>
-              <a:buChar char="•"/>
-            </a:pPr>
-            <a:r>
-              <a:rPr lang="en-US" sz="2000" dirty="0"/>
-              <a:t>item.component.html</a:t>
-            </a:r>
-          </a:p>
-          <a:p>
-            <a:pPr marL="573088" lvl="1" indent="-342900">
-              <a:buFont typeface="Arial" panose="020B0604020202020204" pitchFamily="34" charset="0"/>
-              <a:buChar char="•"/>
-            </a:pPr>
-            <a:r>
-              <a:rPr lang="en-US" sz="2000" dirty="0" err="1"/>
-              <a:t>list.component.ts</a:t>
-            </a:r>
-            <a:endParaRPr lang="en-US" sz="2000" dirty="0"/>
-          </a:p>
-          <a:p>
-            <a:pPr marL="573088" lvl="1" indent="-342900">
-              <a:buFont typeface="Arial" panose="020B0604020202020204" pitchFamily="34" charset="0"/>
-              <a:buChar char="•"/>
-            </a:pPr>
-            <a:r>
-              <a:rPr lang="en-US" sz="2000" dirty="0"/>
-              <a:t>list.component.html</a:t>
-            </a:r>
-          </a:p>
-          <a:p>
-            <a:pPr marL="573088" lvl="1" indent="-342900">
-              <a:buFont typeface="Arial" panose="020B0604020202020204" pitchFamily="34" charset="0"/>
-              <a:buChar char="•"/>
-            </a:pPr>
-            <a:endParaRPr lang="en-US" dirty="0"/>
-          </a:p>
-          <a:p>
-            <a:pPr marL="342900" indent="-342900">
-              <a:buFont typeface="Arial" panose="020B0604020202020204" pitchFamily="34" charset="0"/>
-              <a:buChar char="•"/>
-            </a:pPr>
-            <a:endParaRPr lang="en-US" dirty="0"/>
-          </a:p>
-        </p:txBody>
-      </p:sp>
-    </p:spTree>
-    <p:extLst>
-      <p:ext uri="{BB962C8B-B14F-4D97-AF65-F5344CB8AC3E}">
-        <p14:creationId xmlns:p14="http://schemas.microsoft.com/office/powerpoint/2010/main" val="1029063382"/>
-      </p:ext>
-    </p:extLst>
-  </p:cSld>
-  <p:clrMapOvr>
-    <a:masterClrMapping/>
-  </p:clrMapOvr>
-</p:sld>
-</file>
-
-<file path=ppt/slides/slide14.xml><?xml version="1.0" encoding="utf-8"?>
-<p:sld xmlns:a="http://schemas.openxmlformats.org/drawingml/2006/main" xmlns:r="http://schemas.openxmlformats.org/officeDocument/2006/relationships" xmlns:p="http://schemas.openxmlformats.org/presentationml/2006/main">
-  <p:cSld>
-    <p:spTree>
-      <p:nvGrpSpPr>
-        <p:cNvPr id="1" name=""/>
-        <p:cNvGrpSpPr/>
-        <p:nvPr/>
-      </p:nvGrpSpPr>
-      <p:grpSpPr>
-        <a:xfrm>
-          <a:off x="0" y="0"/>
-          <a:ext cx="0" cy="0"/>
-          <a:chOff x="0" y="0"/>
-          <a:chExt cx="0" cy="0"/>
-        </a:xfrm>
-      </p:grpSpPr>
-      <p:sp>
-        <p:nvSpPr>
-          <p:cNvPr id="2" name="Title 1"/>
-          <p:cNvSpPr>
-            <a:spLocks noGrp="1"/>
-          </p:cNvSpPr>
-          <p:nvPr>
-            <p:ph type="title"/>
-          </p:nvPr>
-        </p:nvSpPr>
-        <p:spPr/>
-        <p:txBody>
-          <a:bodyPr/>
-          <a:lstStyle/>
-          <a:p>
-            <a:r>
-              <a:rPr lang="en-US" dirty="0"/>
               <a:t>How to execute</a:t>
             </a:r>
           </a:p>
@@ -9452,7 +9351,7 @@
           <a:p>
             <a:r>
               <a:rPr lang="en-US" dirty="0"/>
-              <a:t>Execute Angular 2 app:</a:t>
+              <a:t>Execute Angular app:</a:t>
             </a:r>
           </a:p>
           <a:p>
@@ -9484,7 +9383,7 @@
 </p:sld>
 </file>
 
-<file path=ppt/slides/slide15.xml><?xml version="1.0" encoding="utf-8"?>
+<file path=ppt/slides/slide14.xml><?xml version="1.0" encoding="utf-8"?>
 <p:sld xmlns:a="http://schemas.openxmlformats.org/drawingml/2006/main" xmlns:r="http://schemas.openxmlformats.org/officeDocument/2006/relationships" xmlns:p="http://schemas.openxmlformats.org/presentationml/2006/main">
   <p:cSld>
     <p:spTree>
@@ -9532,6 +9431,303 @@
     <p:extLst>
       <p:ext uri="{BB962C8B-B14F-4D97-AF65-F5344CB8AC3E}">
         <p14:creationId xmlns:p14="http://schemas.microsoft.com/office/powerpoint/2010/main" val="3620921753"/>
+      </p:ext>
+    </p:extLst>
+  </p:cSld>
+  <p:clrMapOvr>
+    <a:masterClrMapping/>
+  </p:clrMapOvr>
+</p:sld>
+</file>
+
+<file path=ppt/slides/slide15.xml><?xml version="1.0" encoding="utf-8"?>
+<p:sld xmlns:a="http://schemas.openxmlformats.org/drawingml/2006/main" xmlns:r="http://schemas.openxmlformats.org/officeDocument/2006/relationships" xmlns:p="http://schemas.openxmlformats.org/presentationml/2006/main">
+  <p:cSld>
+    <p:spTree>
+      <p:nvGrpSpPr>
+        <p:cNvPr id="1" name=""/>
+        <p:cNvGrpSpPr/>
+        <p:nvPr/>
+      </p:nvGrpSpPr>
+      <p:grpSpPr>
+        <a:xfrm>
+          <a:off x="0" y="0"/>
+          <a:ext cx="0" cy="0"/>
+          <a:chOff x="0" y="0"/>
+          <a:chExt cx="0" cy="0"/>
+        </a:xfrm>
+      </p:grpSpPr>
+      <p:sp>
+        <p:nvSpPr>
+          <p:cNvPr id="2" name="Title 1"/>
+          <p:cNvSpPr>
+            <a:spLocks noGrp="1"/>
+          </p:cNvSpPr>
+          <p:nvPr>
+            <p:ph type="title"/>
+          </p:nvPr>
+        </p:nvSpPr>
+        <p:spPr/>
+        <p:txBody>
+          <a:bodyPr/>
+          <a:lstStyle/>
+          <a:p>
+            <a:r>
+              <a:rPr lang="en-US" dirty="0"/>
+              <a:t>Exercise</a:t>
+            </a:r>
+          </a:p>
+        </p:txBody>
+      </p:sp>
+      <p:sp>
+        <p:nvSpPr>
+          <p:cNvPr id="3" name="Content Placeholder 2"/>
+          <p:cNvSpPr txBox="1">
+            <a:spLocks/>
+          </p:cNvSpPr>
+          <p:nvPr/>
+        </p:nvSpPr>
+        <p:spPr>
+          <a:xfrm>
+            <a:off x="198157" y="838200"/>
+            <a:ext cx="8802967" cy="3394472"/>
+          </a:xfrm>
+          <a:prstGeom prst="rect">
+            <a:avLst/>
+          </a:prstGeom>
+        </p:spPr>
+        <p:txBody>
+          <a:bodyPr/>
+          <a:lstStyle>
+            <a:lvl1pPr marL="228600" indent="-228600" algn="l" defTabSz="457200" rtl="0" eaLnBrk="1" latinLnBrk="0" hangingPunct="1">
+              <a:spcBef>
+                <a:spcPts val="0"/>
+              </a:spcBef>
+              <a:buClr>
+                <a:schemeClr val="accent1"/>
+              </a:buClr>
+              <a:buFont typeface="Wingdings" charset="2"/>
+              <a:buChar char="§"/>
+              <a:defRPr sz="2400" kern="1200">
+                <a:solidFill>
+                  <a:schemeClr val="tx1"/>
+                </a:solidFill>
+                <a:latin typeface="+mn-lt"/>
+                <a:ea typeface="+mn-ea"/>
+                <a:cs typeface="+mn-cs"/>
+              </a:defRPr>
+            </a:lvl1pPr>
+            <a:lvl2pPr marL="455613" indent="-227013" algn="l" defTabSz="457200" rtl="0" eaLnBrk="1" latinLnBrk="0" hangingPunct="1">
+              <a:spcBef>
+                <a:spcPts val="0"/>
+              </a:spcBef>
+              <a:buClr>
+                <a:srgbClr val="262626"/>
+              </a:buClr>
+              <a:buFont typeface="Wingdings" charset="2"/>
+              <a:buChar char="§"/>
+              <a:defRPr sz="2000" kern="1200">
+                <a:solidFill>
+                  <a:schemeClr val="tx1"/>
+                </a:solidFill>
+                <a:latin typeface="+mn-lt"/>
+                <a:ea typeface="+mn-ea"/>
+                <a:cs typeface="+mn-cs"/>
+              </a:defRPr>
+            </a:lvl2pPr>
+            <a:lvl3pPr marL="455613" indent="-228600" algn="l" defTabSz="457200" rtl="0" eaLnBrk="1" latinLnBrk="0" hangingPunct="1">
+              <a:spcBef>
+                <a:spcPts val="0"/>
+              </a:spcBef>
+              <a:buClr>
+                <a:srgbClr val="262626"/>
+              </a:buClr>
+              <a:buFont typeface="Wingdings" charset="2"/>
+              <a:buChar char="§"/>
+              <a:defRPr sz="2000" kern="1200">
+                <a:solidFill>
+                  <a:schemeClr val="tx1"/>
+                </a:solidFill>
+                <a:latin typeface="+mn-lt"/>
+                <a:ea typeface="+mn-ea"/>
+                <a:cs typeface="+mn-cs"/>
+              </a:defRPr>
+            </a:lvl3pPr>
+            <a:lvl4pPr marL="455613" indent="-228600" algn="l" defTabSz="457200" rtl="0" eaLnBrk="1" latinLnBrk="0" hangingPunct="1">
+              <a:spcBef>
+                <a:spcPts val="0"/>
+              </a:spcBef>
+              <a:buClr>
+                <a:srgbClr val="262626"/>
+              </a:buClr>
+              <a:buFont typeface="Wingdings" charset="2"/>
+              <a:buChar char="§"/>
+              <a:defRPr sz="2000" kern="1200">
+                <a:solidFill>
+                  <a:schemeClr val="tx1"/>
+                </a:solidFill>
+                <a:latin typeface="+mn-lt"/>
+                <a:ea typeface="+mn-ea"/>
+                <a:cs typeface="+mn-cs"/>
+              </a:defRPr>
+            </a:lvl4pPr>
+            <a:lvl5pPr marL="455613" indent="-228600" algn="l" defTabSz="457200" rtl="0" eaLnBrk="1" latinLnBrk="0" hangingPunct="1">
+              <a:spcBef>
+                <a:spcPts val="200"/>
+              </a:spcBef>
+              <a:buClr>
+                <a:srgbClr val="262626"/>
+              </a:buClr>
+              <a:buFont typeface="Wingdings" charset="2"/>
+              <a:buChar char="§"/>
+              <a:defRPr sz="2000" kern="1200">
+                <a:solidFill>
+                  <a:schemeClr val="tx1"/>
+                </a:solidFill>
+                <a:latin typeface="+mn-lt"/>
+                <a:ea typeface="+mn-ea"/>
+                <a:cs typeface="+mn-cs"/>
+              </a:defRPr>
+            </a:lvl5pPr>
+            <a:lvl6pPr marL="2514600" indent="-228600" algn="l" defTabSz="457200" rtl="0" eaLnBrk="1" latinLnBrk="0" hangingPunct="1">
+              <a:spcBef>
+                <a:spcPct val="20000"/>
+              </a:spcBef>
+              <a:buFont typeface="Arial"/>
+              <a:buChar char="•"/>
+              <a:defRPr sz="2000" kern="1200">
+                <a:solidFill>
+                  <a:schemeClr val="tx1"/>
+                </a:solidFill>
+                <a:latin typeface="+mn-lt"/>
+                <a:ea typeface="+mn-ea"/>
+                <a:cs typeface="+mn-cs"/>
+              </a:defRPr>
+            </a:lvl6pPr>
+            <a:lvl7pPr marL="2971800" indent="-228600" algn="l" defTabSz="457200" rtl="0" eaLnBrk="1" latinLnBrk="0" hangingPunct="1">
+              <a:spcBef>
+                <a:spcPct val="20000"/>
+              </a:spcBef>
+              <a:buFont typeface="Arial"/>
+              <a:buChar char="•"/>
+              <a:defRPr sz="2000" kern="1200">
+                <a:solidFill>
+                  <a:schemeClr val="tx1"/>
+                </a:solidFill>
+                <a:latin typeface="+mn-lt"/>
+                <a:ea typeface="+mn-ea"/>
+                <a:cs typeface="+mn-cs"/>
+              </a:defRPr>
+            </a:lvl7pPr>
+            <a:lvl8pPr marL="3429000" indent="-228600" algn="l" defTabSz="457200" rtl="0" eaLnBrk="1" latinLnBrk="0" hangingPunct="1">
+              <a:spcBef>
+                <a:spcPct val="20000"/>
+              </a:spcBef>
+              <a:buFont typeface="Arial"/>
+              <a:buChar char="•"/>
+              <a:defRPr sz="2000" kern="1200">
+                <a:solidFill>
+                  <a:schemeClr val="tx1"/>
+                </a:solidFill>
+                <a:latin typeface="+mn-lt"/>
+                <a:ea typeface="+mn-ea"/>
+                <a:cs typeface="+mn-cs"/>
+              </a:defRPr>
+            </a:lvl8pPr>
+            <a:lvl9pPr marL="3886200" indent="-228600" algn="l" defTabSz="457200" rtl="0" eaLnBrk="1" latinLnBrk="0" hangingPunct="1">
+              <a:spcBef>
+                <a:spcPct val="20000"/>
+              </a:spcBef>
+              <a:buFont typeface="Arial"/>
+              <a:buChar char="•"/>
+              <a:defRPr sz="2000" kern="1200">
+                <a:solidFill>
+                  <a:schemeClr val="tx1"/>
+                </a:solidFill>
+                <a:latin typeface="+mn-lt"/>
+                <a:ea typeface="+mn-ea"/>
+                <a:cs typeface="+mn-cs"/>
+              </a:defRPr>
+            </a:lvl9pPr>
+          </a:lstStyle>
+          <a:p>
+            <a:pPr marL="342900" indent="-342900">
+              <a:buFont typeface="Arial" charset="0"/>
+              <a:buChar char="•"/>
+            </a:pPr>
+            <a:endParaRPr lang="en-US" dirty="0"/>
+          </a:p>
+          <a:p>
+            <a:pPr marL="342900" indent="-342900">
+              <a:buFont typeface="Arial" charset="0"/>
+              <a:buChar char="•"/>
+            </a:pPr>
+            <a:r>
+              <a:rPr lang="en-US" dirty="0"/>
+              <a:t>Checkout the code from </a:t>
+            </a:r>
+            <a:r>
+              <a:rPr lang="en-US" dirty="0" err="1"/>
+              <a:t>Github</a:t>
+            </a:r>
+            <a:endParaRPr lang="en-US" dirty="0"/>
+          </a:p>
+          <a:p>
+            <a:pPr marL="569913" lvl="1" indent="-342900">
+              <a:buFont typeface="Arial" charset="0"/>
+              <a:buChar char="•"/>
+            </a:pPr>
+            <a:r>
+              <a:rPr lang="en-US" sz="1800" dirty="0">
+                <a:hlinkClick r:id="rId3"/>
+              </a:rPr>
+              <a:t>https://github.com/couchbaselabs/aspnet-nosql-workshop/tree/master/0</a:t>
+            </a:r>
+            <a:r>
+              <a:rPr lang="en-US" sz="1800" dirty="0"/>
+              <a:t>4</a:t>
+            </a:r>
+          </a:p>
+          <a:p>
+            <a:pPr marL="569913" lvl="1" indent="-342900">
+              <a:buFont typeface="Arial" charset="0"/>
+              <a:buChar char="•"/>
+            </a:pPr>
+            <a:endParaRPr lang="en-US" dirty="0"/>
+          </a:p>
+          <a:p>
+            <a:pPr marL="342900" indent="-342900">
+              <a:buFont typeface="Arial" charset="0"/>
+              <a:buChar char="•"/>
+            </a:pPr>
+            <a:r>
+              <a:rPr lang="en-US" dirty="0"/>
+              <a:t>The source code is also available on USB sticks</a:t>
+            </a:r>
+          </a:p>
+          <a:p>
+            <a:pPr marL="342900" indent="-342900">
+              <a:buFont typeface="Arial" charset="0"/>
+              <a:buChar char="•"/>
+            </a:pPr>
+            <a:endParaRPr lang="en-US" dirty="0"/>
+          </a:p>
+          <a:p>
+            <a:pPr marL="342900" indent="-342900">
+              <a:buFont typeface="Arial" charset="0"/>
+              <a:buChar char="•"/>
+            </a:pPr>
+            <a:endParaRPr lang="en-US" b="1" dirty="0"/>
+          </a:p>
+          <a:p>
+            <a:endParaRPr lang="en-US" dirty="0"/>
+          </a:p>
+        </p:txBody>
+      </p:sp>
+    </p:spTree>
+    <p:extLst>
+      <p:ext uri="{BB962C8B-B14F-4D97-AF65-F5344CB8AC3E}">
+        <p14:creationId xmlns:p14="http://schemas.microsoft.com/office/powerpoint/2010/main" val="2933329572"/>
       </p:ext>
     </p:extLst>
   </p:cSld>
@@ -9575,327 +9771,6 @@
           <a:p>
             <a:r>
               <a:rPr lang="en-US" dirty="0"/>
-              <a:t>Exercise: Fill in the blanks</a:t>
-            </a:r>
-          </a:p>
-        </p:txBody>
-      </p:sp>
-      <p:sp>
-        <p:nvSpPr>
-          <p:cNvPr id="3" name="Content Placeholder 2"/>
-          <p:cNvSpPr txBox="1">
-            <a:spLocks/>
-          </p:cNvSpPr>
-          <p:nvPr/>
-        </p:nvSpPr>
-        <p:spPr>
-          <a:xfrm>
-            <a:off x="198157" y="838200"/>
-            <a:ext cx="8802967" cy="3394472"/>
-          </a:xfrm>
-          <a:prstGeom prst="rect">
-            <a:avLst/>
-          </a:prstGeom>
-        </p:spPr>
-        <p:txBody>
-          <a:bodyPr/>
-          <a:lstStyle>
-            <a:lvl1pPr marL="228600" indent="-228600" algn="l" defTabSz="457200" rtl="0" eaLnBrk="1" latinLnBrk="0" hangingPunct="1">
-              <a:spcBef>
-                <a:spcPts val="0"/>
-              </a:spcBef>
-              <a:buClr>
-                <a:schemeClr val="accent1"/>
-              </a:buClr>
-              <a:buFont typeface="Wingdings" charset="2"/>
-              <a:buChar char="§"/>
-              <a:defRPr sz="2400" kern="1200">
-                <a:solidFill>
-                  <a:schemeClr val="tx1"/>
-                </a:solidFill>
-                <a:latin typeface="+mn-lt"/>
-                <a:ea typeface="+mn-ea"/>
-                <a:cs typeface="+mn-cs"/>
-              </a:defRPr>
-            </a:lvl1pPr>
-            <a:lvl2pPr marL="455613" indent="-227013" algn="l" defTabSz="457200" rtl="0" eaLnBrk="1" latinLnBrk="0" hangingPunct="1">
-              <a:spcBef>
-                <a:spcPts val="0"/>
-              </a:spcBef>
-              <a:buClr>
-                <a:srgbClr val="262626"/>
-              </a:buClr>
-              <a:buFont typeface="Wingdings" charset="2"/>
-              <a:buChar char="§"/>
-              <a:defRPr sz="2000" kern="1200">
-                <a:solidFill>
-                  <a:schemeClr val="tx1"/>
-                </a:solidFill>
-                <a:latin typeface="+mn-lt"/>
-                <a:ea typeface="+mn-ea"/>
-                <a:cs typeface="+mn-cs"/>
-              </a:defRPr>
-            </a:lvl2pPr>
-            <a:lvl3pPr marL="455613" indent="-228600" algn="l" defTabSz="457200" rtl="0" eaLnBrk="1" latinLnBrk="0" hangingPunct="1">
-              <a:spcBef>
-                <a:spcPts val="0"/>
-              </a:spcBef>
-              <a:buClr>
-                <a:srgbClr val="262626"/>
-              </a:buClr>
-              <a:buFont typeface="Wingdings" charset="2"/>
-              <a:buChar char="§"/>
-              <a:defRPr sz="2000" kern="1200">
-                <a:solidFill>
-                  <a:schemeClr val="tx1"/>
-                </a:solidFill>
-                <a:latin typeface="+mn-lt"/>
-                <a:ea typeface="+mn-ea"/>
-                <a:cs typeface="+mn-cs"/>
-              </a:defRPr>
-            </a:lvl3pPr>
-            <a:lvl4pPr marL="455613" indent="-228600" algn="l" defTabSz="457200" rtl="0" eaLnBrk="1" latinLnBrk="0" hangingPunct="1">
-              <a:spcBef>
-                <a:spcPts val="0"/>
-              </a:spcBef>
-              <a:buClr>
-                <a:srgbClr val="262626"/>
-              </a:buClr>
-              <a:buFont typeface="Wingdings" charset="2"/>
-              <a:buChar char="§"/>
-              <a:defRPr sz="2000" kern="1200">
-                <a:solidFill>
-                  <a:schemeClr val="tx1"/>
-                </a:solidFill>
-                <a:latin typeface="+mn-lt"/>
-                <a:ea typeface="+mn-ea"/>
-                <a:cs typeface="+mn-cs"/>
-              </a:defRPr>
-            </a:lvl4pPr>
-            <a:lvl5pPr marL="455613" indent="-228600" algn="l" defTabSz="457200" rtl="0" eaLnBrk="1" latinLnBrk="0" hangingPunct="1">
-              <a:spcBef>
-                <a:spcPts val="200"/>
-              </a:spcBef>
-              <a:buClr>
-                <a:srgbClr val="262626"/>
-              </a:buClr>
-              <a:buFont typeface="Wingdings" charset="2"/>
-              <a:buChar char="§"/>
-              <a:defRPr sz="2000" kern="1200">
-                <a:solidFill>
-                  <a:schemeClr val="tx1"/>
-                </a:solidFill>
-                <a:latin typeface="+mn-lt"/>
-                <a:ea typeface="+mn-ea"/>
-                <a:cs typeface="+mn-cs"/>
-              </a:defRPr>
-            </a:lvl5pPr>
-            <a:lvl6pPr marL="2514600" indent="-228600" algn="l" defTabSz="457200" rtl="0" eaLnBrk="1" latinLnBrk="0" hangingPunct="1">
-              <a:spcBef>
-                <a:spcPct val="20000"/>
-              </a:spcBef>
-              <a:buFont typeface="Arial"/>
-              <a:buChar char="•"/>
-              <a:defRPr sz="2000" kern="1200">
-                <a:solidFill>
-                  <a:schemeClr val="tx1"/>
-                </a:solidFill>
-                <a:latin typeface="+mn-lt"/>
-                <a:ea typeface="+mn-ea"/>
-                <a:cs typeface="+mn-cs"/>
-              </a:defRPr>
-            </a:lvl6pPr>
-            <a:lvl7pPr marL="2971800" indent="-228600" algn="l" defTabSz="457200" rtl="0" eaLnBrk="1" latinLnBrk="0" hangingPunct="1">
-              <a:spcBef>
-                <a:spcPct val="20000"/>
-              </a:spcBef>
-              <a:buFont typeface="Arial"/>
-              <a:buChar char="•"/>
-              <a:defRPr sz="2000" kern="1200">
-                <a:solidFill>
-                  <a:schemeClr val="tx1"/>
-                </a:solidFill>
-                <a:latin typeface="+mn-lt"/>
-                <a:ea typeface="+mn-ea"/>
-                <a:cs typeface="+mn-cs"/>
-              </a:defRPr>
-            </a:lvl7pPr>
-            <a:lvl8pPr marL="3429000" indent="-228600" algn="l" defTabSz="457200" rtl="0" eaLnBrk="1" latinLnBrk="0" hangingPunct="1">
-              <a:spcBef>
-                <a:spcPct val="20000"/>
-              </a:spcBef>
-              <a:buFont typeface="Arial"/>
-              <a:buChar char="•"/>
-              <a:defRPr sz="2000" kern="1200">
-                <a:solidFill>
-                  <a:schemeClr val="tx1"/>
-                </a:solidFill>
-                <a:latin typeface="+mn-lt"/>
-                <a:ea typeface="+mn-ea"/>
-                <a:cs typeface="+mn-cs"/>
-              </a:defRPr>
-            </a:lvl8pPr>
-            <a:lvl9pPr marL="3886200" indent="-228600" algn="l" defTabSz="457200" rtl="0" eaLnBrk="1" latinLnBrk="0" hangingPunct="1">
-              <a:spcBef>
-                <a:spcPct val="20000"/>
-              </a:spcBef>
-              <a:buFont typeface="Arial"/>
-              <a:buChar char="•"/>
-              <a:defRPr sz="2000" kern="1200">
-                <a:solidFill>
-                  <a:schemeClr val="tx1"/>
-                </a:solidFill>
-                <a:latin typeface="+mn-lt"/>
-                <a:ea typeface="+mn-ea"/>
-                <a:cs typeface="+mn-cs"/>
-              </a:defRPr>
-            </a:lvl9pPr>
-          </a:lstStyle>
-          <a:p>
-            <a:pPr marL="342900" indent="-342900">
-              <a:buFont typeface="Arial" charset="0"/>
-              <a:buChar char="•"/>
-            </a:pPr>
-            <a:r>
-              <a:rPr lang="en-US" dirty="0"/>
-              <a:t>Fill in the blanks to make the application work</a:t>
-            </a:r>
-          </a:p>
-          <a:p>
-            <a:pPr marL="569913" lvl="1" indent="-342900">
-              <a:buFont typeface="Arial" charset="0"/>
-              <a:buChar char="•"/>
-            </a:pPr>
-            <a:r>
-              <a:rPr lang="en-US" dirty="0" err="1"/>
-              <a:t>angular_workshop</a:t>
-            </a:r>
-            <a:endParaRPr lang="en-US" dirty="0"/>
-          </a:p>
-          <a:p>
-            <a:pPr marL="569913" lvl="1" indent="-342900">
-              <a:buFont typeface="Arial" charset="0"/>
-              <a:buChar char="•"/>
-            </a:pPr>
-            <a:r>
-              <a:rPr lang="en-US" dirty="0"/>
-              <a:t>Completed versions are in the angular folder</a:t>
-            </a:r>
-          </a:p>
-          <a:p>
-            <a:pPr marL="342900" indent="-342900">
-              <a:buFont typeface="Arial" charset="0"/>
-              <a:buChar char="•"/>
-            </a:pPr>
-            <a:endParaRPr lang="en-US" dirty="0"/>
-          </a:p>
-          <a:p>
-            <a:pPr marL="342900" indent="-342900">
-              <a:buFont typeface="Arial" charset="0"/>
-              <a:buChar char="•"/>
-            </a:pPr>
-            <a:r>
-              <a:rPr lang="en-US" dirty="0"/>
-              <a:t>Checkout the code from </a:t>
-            </a:r>
-            <a:r>
-              <a:rPr lang="en-US" dirty="0" err="1"/>
-              <a:t>Github</a:t>
-            </a:r>
-            <a:endParaRPr lang="en-US" dirty="0"/>
-          </a:p>
-          <a:p>
-            <a:pPr marL="569913" lvl="1" indent="-342900">
-              <a:buFont typeface="Arial" charset="0"/>
-              <a:buChar char="•"/>
-            </a:pPr>
-            <a:r>
-              <a:rPr lang="en-US" sz="1800" dirty="0">
-                <a:hlinkClick r:id="rId2"/>
-              </a:rPr>
-              <a:t>https://github.com/couchbaselabs/aspnet-nosql-workshop/tree/master/0</a:t>
-            </a:r>
-            <a:r>
-              <a:rPr lang="en-US" sz="1800" dirty="0"/>
-              <a:t>4</a:t>
-            </a:r>
-          </a:p>
-          <a:p>
-            <a:pPr marL="569913" lvl="1" indent="-342900">
-              <a:buFont typeface="Arial" charset="0"/>
-              <a:buChar char="•"/>
-            </a:pPr>
-            <a:endParaRPr lang="en-US" dirty="0"/>
-          </a:p>
-          <a:p>
-            <a:pPr marL="342900" indent="-342900">
-              <a:buFont typeface="Arial" charset="0"/>
-              <a:buChar char="•"/>
-            </a:pPr>
-            <a:r>
-              <a:rPr lang="en-US" dirty="0"/>
-              <a:t>The source code is also available on USB sticks</a:t>
-            </a:r>
-          </a:p>
-          <a:p>
-            <a:pPr marL="342900" indent="-342900">
-              <a:buFont typeface="Arial" charset="0"/>
-              <a:buChar char="•"/>
-            </a:pPr>
-            <a:endParaRPr lang="en-US" b="1" dirty="0"/>
-          </a:p>
-          <a:p>
-            <a:endParaRPr lang="en-US" dirty="0"/>
-          </a:p>
-        </p:txBody>
-      </p:sp>
-    </p:spTree>
-    <p:extLst>
-      <p:ext uri="{BB962C8B-B14F-4D97-AF65-F5344CB8AC3E}">
-        <p14:creationId xmlns:p14="http://schemas.microsoft.com/office/powerpoint/2010/main" val="2933329572"/>
-      </p:ext>
-    </p:extLst>
-  </p:cSld>
-  <p:clrMapOvr>
-    <a:masterClrMapping/>
-  </p:clrMapOvr>
-</p:sld>
-</file>
-
-<file path=ppt/slides/slide17.xml><?xml version="1.0" encoding="utf-8"?>
-<p:sld xmlns:a="http://schemas.openxmlformats.org/drawingml/2006/main" xmlns:r="http://schemas.openxmlformats.org/officeDocument/2006/relationships" xmlns:p="http://schemas.openxmlformats.org/presentationml/2006/main">
-  <p:cSld>
-    <p:spTree>
-      <p:nvGrpSpPr>
-        <p:cNvPr id="1" name=""/>
-        <p:cNvGrpSpPr/>
-        <p:nvPr/>
-      </p:nvGrpSpPr>
-      <p:grpSpPr>
-        <a:xfrm>
-          <a:off x="0" y="0"/>
-          <a:ext cx="0" cy="0"/>
-          <a:chOff x="0" y="0"/>
-          <a:chExt cx="0" cy="0"/>
-        </a:xfrm>
-      </p:grpSpPr>
-      <p:sp>
-        <p:nvSpPr>
-          <p:cNvPr id="2" name="Title 1"/>
-          <p:cNvSpPr>
-            <a:spLocks noGrp="1"/>
-          </p:cNvSpPr>
-          <p:nvPr>
-            <p:ph type="title"/>
-          </p:nvPr>
-        </p:nvSpPr>
-        <p:spPr/>
-        <p:txBody>
-          <a:bodyPr/>
-          <a:lstStyle/>
-          <a:p>
-            <a:r>
-              <a:rPr lang="en-US" dirty="0"/>
               <a:t>Exercise: Getting Started</a:t>
             </a:r>
           </a:p>
@@ -9917,24 +9792,6 @@
           <a:lstStyle/>
           <a:p>
             <a:r>
-              <a:rPr lang="en-US" dirty="0"/>
-              <a:t>We’re going to fill in one of the blanks together, one for each language/platform.</a:t>
-            </a:r>
-          </a:p>
-          <a:p>
-            <a:endParaRPr lang="en-US" dirty="0"/>
-          </a:p>
-          <a:p>
-            <a:r>
-              <a:rPr lang="en-US" dirty="0"/>
-              <a:t>The rest of the them are up to you.</a:t>
-            </a:r>
-          </a:p>
-          <a:p>
-            <a:endParaRPr lang="en-US" dirty="0"/>
-          </a:p>
-          <a:p>
-            <a:r>
               <a:rPr lang="en-US" b="1" dirty="0"/>
               <a:t>At the end of the lab, your app should be able to </a:t>
             </a:r>
@@ -9949,7 +9806,15 @@
           <a:p>
             <a:r>
               <a:rPr lang="en-US" dirty="0"/>
-              <a:t>If you have questions or are running into a problem, we’ll be walking around helping you individually.</a:t>
+              <a:t>If you have questions or are running into a problem</a:t>
+            </a:r>
+            <a:r>
+              <a:rPr lang="en-US"/>
+              <a:t>, I’ll </a:t>
+            </a:r>
+            <a:r>
+              <a:rPr lang="en-US" dirty="0"/>
+              <a:t>be walking around helping you individually.</a:t>
             </a:r>
           </a:p>
         </p:txBody>
@@ -10154,7 +10019,7 @@
             </a:pPr>
             <a:r>
               <a:rPr lang="en-US" dirty="0"/>
-              <a:t>Angular 2 (UI)</a:t>
+              <a:t>Angular 4 (UI)</a:t>
             </a:r>
           </a:p>
           <a:p>
@@ -12645,7 +12510,7 @@
           <a:p>
             <a:r>
               <a:rPr lang="en-US" dirty="0"/>
-              <a:t>GET using Http</a:t>
+              <a:t>GET using HTTP</a:t>
             </a:r>
           </a:p>
         </p:txBody>

</xml_diff>